<commit_message>
[ML Models] Rename dissertation files and update data source link for building energy consumption prediction.
</commit_message>
<xml_diff>
--- a/MSc Poster Dissertation.pptx
+++ b/MSc Poster Dissertation.pptx
@@ -270,7 +270,7 @@
           <a:p>
             <a:fld id="{B1D00C88-309E-4A4F-8847-ED100B1C819C}" type="datetimeFigureOut">
               <a:rPr lang="en-GB" smtClean="0"/>
-              <a:t>05/09/2023</a:t>
+              <a:t>09/09/2023</a:t>
             </a:fld>
             <a:endParaRPr lang="en-GB"/>
           </a:p>
@@ -470,7 +470,7 @@
           <a:p>
             <a:fld id="{B1D00C88-309E-4A4F-8847-ED100B1C819C}" type="datetimeFigureOut">
               <a:rPr lang="en-GB" smtClean="0"/>
-              <a:t>05/09/2023</a:t>
+              <a:t>09/09/2023</a:t>
             </a:fld>
             <a:endParaRPr lang="en-GB"/>
           </a:p>
@@ -680,7 +680,7 @@
           <a:p>
             <a:fld id="{B1D00C88-309E-4A4F-8847-ED100B1C819C}" type="datetimeFigureOut">
               <a:rPr lang="en-GB" smtClean="0"/>
-              <a:t>05/09/2023</a:t>
+              <a:t>09/09/2023</a:t>
             </a:fld>
             <a:endParaRPr lang="en-GB"/>
           </a:p>
@@ -880,7 +880,7 @@
           <a:p>
             <a:fld id="{B1D00C88-309E-4A4F-8847-ED100B1C819C}" type="datetimeFigureOut">
               <a:rPr lang="en-GB" smtClean="0"/>
-              <a:t>05/09/2023</a:t>
+              <a:t>09/09/2023</a:t>
             </a:fld>
             <a:endParaRPr lang="en-GB"/>
           </a:p>
@@ -1156,7 +1156,7 @@
           <a:p>
             <a:fld id="{B1D00C88-309E-4A4F-8847-ED100B1C819C}" type="datetimeFigureOut">
               <a:rPr lang="en-GB" smtClean="0"/>
-              <a:t>05/09/2023</a:t>
+              <a:t>09/09/2023</a:t>
             </a:fld>
             <a:endParaRPr lang="en-GB"/>
           </a:p>
@@ -1424,7 +1424,7 @@
           <a:p>
             <a:fld id="{B1D00C88-309E-4A4F-8847-ED100B1C819C}" type="datetimeFigureOut">
               <a:rPr lang="en-GB" smtClean="0"/>
-              <a:t>05/09/2023</a:t>
+              <a:t>09/09/2023</a:t>
             </a:fld>
             <a:endParaRPr lang="en-GB"/>
           </a:p>
@@ -1839,7 +1839,7 @@
           <a:p>
             <a:fld id="{B1D00C88-309E-4A4F-8847-ED100B1C819C}" type="datetimeFigureOut">
               <a:rPr lang="en-GB" smtClean="0"/>
-              <a:t>05/09/2023</a:t>
+              <a:t>09/09/2023</a:t>
             </a:fld>
             <a:endParaRPr lang="en-GB"/>
           </a:p>
@@ -1981,7 +1981,7 @@
           <a:p>
             <a:fld id="{B1D00C88-309E-4A4F-8847-ED100B1C819C}" type="datetimeFigureOut">
               <a:rPr lang="en-GB" smtClean="0"/>
-              <a:t>05/09/2023</a:t>
+              <a:t>09/09/2023</a:t>
             </a:fld>
             <a:endParaRPr lang="en-GB"/>
           </a:p>
@@ -2094,7 +2094,7 @@
           <a:p>
             <a:fld id="{B1D00C88-309E-4A4F-8847-ED100B1C819C}" type="datetimeFigureOut">
               <a:rPr lang="en-GB" smtClean="0"/>
-              <a:t>05/09/2023</a:t>
+              <a:t>09/09/2023</a:t>
             </a:fld>
             <a:endParaRPr lang="en-GB"/>
           </a:p>
@@ -2407,7 +2407,7 @@
           <a:p>
             <a:fld id="{B1D00C88-309E-4A4F-8847-ED100B1C819C}" type="datetimeFigureOut">
               <a:rPr lang="en-GB" smtClean="0"/>
-              <a:t>05/09/2023</a:t>
+              <a:t>09/09/2023</a:t>
             </a:fld>
             <a:endParaRPr lang="en-GB"/>
           </a:p>
@@ -2696,7 +2696,7 @@
           <a:p>
             <a:fld id="{B1D00C88-309E-4A4F-8847-ED100B1C819C}" type="datetimeFigureOut">
               <a:rPr lang="en-GB" smtClean="0"/>
-              <a:t>05/09/2023</a:t>
+              <a:t>09/09/2023</a:t>
             </a:fld>
             <a:endParaRPr lang="en-GB"/>
           </a:p>
@@ -2939,7 +2939,7 @@
           <a:p>
             <a:fld id="{B1D00C88-309E-4A4F-8847-ED100B1C819C}" type="datetimeFigureOut">
               <a:rPr lang="en-GB" smtClean="0"/>
-              <a:t>05/09/2023</a:t>
+              <a:t>09/09/2023</a:t>
             </a:fld>
             <a:endParaRPr lang="en-GB"/>
           </a:p>
@@ -7599,8 +7599,11 @@
               <a:rPr lang="en-GB" dirty="0">
                 <a:hlinkClick r:id="rId2"/>
               </a:rPr>
-              <a:t>Meeting with Folson, Kobina (Student)-20230907_194805-Meeting Recording.mp4</a:t>
+              <a:t>https://youtu.be/zjvLZdO7-A8</a:t>
             </a:r>
+            <a:br>
+              <a:rPr lang="en-GB" dirty="0"/>
+            </a:br>
             <a:endParaRPr lang="en-GB" dirty="0"/>
           </a:p>
           <a:p>
@@ -7629,7 +7632,6 @@
               <a:solidFill>
                 <a:srgbClr val="DCA10D"/>
               </a:solidFill>
-              <a:effectLst/>
               <a:latin typeface="Helvetica Neue" panose="02000503000000020004" pitchFamily="2" charset="0"/>
             </a:endParaRPr>
           </a:p>

</xml_diff>